<commit_message>
Added administrator to diagram
</commit_message>
<xml_diff>
--- a/docs/images/trend-micro-control-tower-architecture-diagram [DM].pptx
+++ b/docs/images/trend-micro-control-tower-architecture-diagram [DM].pptx
@@ -259,7 +259,7 @@
           <a:p>
             <a:fld id="{ADA85DEE-7315-314A-B60C-A7F72F0C0570}" type="datetimeFigureOut">
               <a:rPr lang="en-US" smtClean="0"/>
-              <a:t>7/7/2021</a:t>
+              <a:t>7/19/2021</a:t>
             </a:fld>
             <a:endParaRPr lang="en-US"/>
           </a:p>
@@ -457,7 +457,7 @@
           <a:p>
             <a:fld id="{ADA85DEE-7315-314A-B60C-A7F72F0C0570}" type="datetimeFigureOut">
               <a:rPr lang="en-US" smtClean="0"/>
-              <a:t>7/7/2021</a:t>
+              <a:t>7/19/2021</a:t>
             </a:fld>
             <a:endParaRPr lang="en-US"/>
           </a:p>
@@ -665,7 +665,7 @@
           <a:p>
             <a:fld id="{ADA85DEE-7315-314A-B60C-A7F72F0C0570}" type="datetimeFigureOut">
               <a:rPr lang="en-US" smtClean="0"/>
-              <a:t>7/7/2021</a:t>
+              <a:t>7/19/2021</a:t>
             </a:fld>
             <a:endParaRPr lang="en-US"/>
           </a:p>
@@ -863,7 +863,7 @@
           <a:p>
             <a:fld id="{ADA85DEE-7315-314A-B60C-A7F72F0C0570}" type="datetimeFigureOut">
               <a:rPr lang="en-US" smtClean="0"/>
-              <a:t>7/7/2021</a:t>
+              <a:t>7/19/2021</a:t>
             </a:fld>
             <a:endParaRPr lang="en-US"/>
           </a:p>
@@ -1138,7 +1138,7 @@
           <a:p>
             <a:fld id="{ADA85DEE-7315-314A-B60C-A7F72F0C0570}" type="datetimeFigureOut">
               <a:rPr lang="en-US" smtClean="0"/>
-              <a:t>7/7/2021</a:t>
+              <a:t>7/19/2021</a:t>
             </a:fld>
             <a:endParaRPr lang="en-US"/>
           </a:p>
@@ -1403,7 +1403,7 @@
           <a:p>
             <a:fld id="{ADA85DEE-7315-314A-B60C-A7F72F0C0570}" type="datetimeFigureOut">
               <a:rPr lang="en-US" smtClean="0"/>
-              <a:t>7/7/2021</a:t>
+              <a:t>7/19/2021</a:t>
             </a:fld>
             <a:endParaRPr lang="en-US"/>
           </a:p>
@@ -1815,7 +1815,7 @@
           <a:p>
             <a:fld id="{ADA85DEE-7315-314A-B60C-A7F72F0C0570}" type="datetimeFigureOut">
               <a:rPr lang="en-US" smtClean="0"/>
-              <a:t>7/7/2021</a:t>
+              <a:t>7/19/2021</a:t>
             </a:fld>
             <a:endParaRPr lang="en-US"/>
           </a:p>
@@ -1956,7 +1956,7 @@
           <a:p>
             <a:fld id="{ADA85DEE-7315-314A-B60C-A7F72F0C0570}" type="datetimeFigureOut">
               <a:rPr lang="en-US" smtClean="0"/>
-              <a:t>7/7/2021</a:t>
+              <a:t>7/19/2021</a:t>
             </a:fld>
             <a:endParaRPr lang="en-US"/>
           </a:p>
@@ -2069,7 +2069,7 @@
           <a:p>
             <a:fld id="{ADA85DEE-7315-314A-B60C-A7F72F0C0570}" type="datetimeFigureOut">
               <a:rPr lang="en-US" smtClean="0"/>
-              <a:t>7/7/2021</a:t>
+              <a:t>7/19/2021</a:t>
             </a:fld>
             <a:endParaRPr lang="en-US"/>
           </a:p>
@@ -2380,7 +2380,7 @@
           <a:p>
             <a:fld id="{ADA85DEE-7315-314A-B60C-A7F72F0C0570}" type="datetimeFigureOut">
               <a:rPr lang="en-US" smtClean="0"/>
-              <a:t>7/7/2021</a:t>
+              <a:t>7/19/2021</a:t>
             </a:fld>
             <a:endParaRPr lang="en-US"/>
           </a:p>
@@ -2668,7 +2668,7 @@
           <a:p>
             <a:fld id="{ADA85DEE-7315-314A-B60C-A7F72F0C0570}" type="datetimeFigureOut">
               <a:rPr lang="en-US" smtClean="0"/>
-              <a:t>7/7/2021</a:t>
+              <a:t>7/19/2021</a:t>
             </a:fld>
             <a:endParaRPr lang="en-US"/>
           </a:p>
@@ -2909,7 +2909,7 @@
           <a:p>
             <a:fld id="{ADA85DEE-7315-314A-B60C-A7F72F0C0570}" type="datetimeFigureOut">
               <a:rPr lang="en-US" smtClean="0"/>
-              <a:t>7/7/2021</a:t>
+              <a:t>7/19/2021</a:t>
             </a:fld>
             <a:endParaRPr lang="en-US"/>
           </a:p>
@@ -3355,7 +3355,7 @@
         </p:blipFill>
         <p:spPr bwMode="auto">
           <a:xfrm>
-            <a:off x="1280160" y="1585976"/>
+            <a:off x="3016786" y="1864013"/>
             <a:ext cx="762000" cy="762000"/>
           </a:xfrm>
           <a:prstGeom prst="rect">
@@ -3402,7 +3402,7 @@
         </p:nvSpPr>
         <p:spPr bwMode="auto">
           <a:xfrm>
-            <a:off x="964096" y="2351004"/>
+            <a:off x="2700722" y="2629041"/>
             <a:ext cx="1398542" cy="461665"/>
           </a:xfrm>
           <a:prstGeom prst="rect">
@@ -3576,7 +3576,7 @@
         </p:blipFill>
         <p:spPr bwMode="auto">
           <a:xfrm>
-            <a:off x="3017520" y="1586718"/>
+            <a:off x="4754146" y="1864755"/>
             <a:ext cx="762000" cy="762000"/>
           </a:xfrm>
           <a:prstGeom prst="rect">
@@ -3623,7 +3623,7 @@
         </p:nvSpPr>
         <p:spPr bwMode="auto">
           <a:xfrm>
-            <a:off x="2847275" y="2339340"/>
+            <a:off x="4583901" y="2617377"/>
             <a:ext cx="1168218" cy="461665"/>
           </a:xfrm>
           <a:prstGeom prst="rect">
@@ -3797,7 +3797,7 @@
         </p:blipFill>
         <p:spPr bwMode="auto">
           <a:xfrm>
-            <a:off x="5767543" y="2999567"/>
+            <a:off x="7504169" y="3277604"/>
             <a:ext cx="762000" cy="762000"/>
           </a:xfrm>
           <a:prstGeom prst="rect">
@@ -3844,7 +3844,7 @@
         </p:nvSpPr>
         <p:spPr bwMode="auto">
           <a:xfrm>
-            <a:off x="5507729" y="3768145"/>
+            <a:off x="7244355" y="4046182"/>
             <a:ext cx="1279393" cy="461665"/>
           </a:xfrm>
           <a:prstGeom prst="rect">
@@ -4003,7 +4003,7 @@
         </p:nvSpPr>
         <p:spPr>
           <a:xfrm>
-            <a:off x="640080" y="640080"/>
+            <a:off x="2376706" y="918117"/>
             <a:ext cx="6583680" cy="5029200"/>
           </a:xfrm>
           <a:prstGeom prst="rect">
@@ -4094,7 +4094,7 @@
         </p:blipFill>
         <p:spPr bwMode="auto">
           <a:xfrm>
-            <a:off x="640080" y="640080"/>
+            <a:off x="2376706" y="918117"/>
             <a:ext cx="330200" cy="330200"/>
           </a:xfrm>
           <a:prstGeom prst="rect">
@@ -4141,7 +4141,7 @@
         </p:nvSpPr>
         <p:spPr bwMode="auto">
           <a:xfrm>
-            <a:off x="2685200" y="4848255"/>
+            <a:off x="4421826" y="5126292"/>
             <a:ext cx="1362074" cy="430887"/>
           </a:xfrm>
           <a:prstGeom prst="rect">
@@ -4323,7 +4323,7 @@
         </p:blipFill>
         <p:spPr bwMode="auto">
           <a:xfrm>
-            <a:off x="3138994" y="4387265"/>
+            <a:off x="4875620" y="4665302"/>
             <a:ext cx="457200" cy="457200"/>
           </a:xfrm>
           <a:prstGeom prst="rect">
@@ -4370,7 +4370,7 @@
         </p:nvSpPr>
         <p:spPr bwMode="auto">
           <a:xfrm>
-            <a:off x="1251736" y="4846594"/>
+            <a:off x="2988362" y="5124631"/>
             <a:ext cx="822960" cy="274320"/>
           </a:xfrm>
           <a:prstGeom prst="rect">
@@ -4549,7 +4549,7 @@
         </p:blipFill>
         <p:spPr bwMode="auto">
           <a:xfrm>
-            <a:off x="1435100" y="4387265"/>
+            <a:off x="3171726" y="4665302"/>
             <a:ext cx="457200" cy="457200"/>
           </a:xfrm>
           <a:prstGeom prst="rect">
@@ -4596,7 +4596,7 @@
         </p:nvSpPr>
         <p:spPr bwMode="auto">
           <a:xfrm>
-            <a:off x="5378699" y="4846320"/>
+            <a:off x="7115325" y="5124357"/>
             <a:ext cx="1561668" cy="430887"/>
           </a:xfrm>
           <a:prstGeom prst="rect">
@@ -4736,15 +4736,7 @@
                 <a:ea typeface="Amazon Ember" panose="020B0603020204020204" pitchFamily="34" charset="0"/>
                 <a:cs typeface="Arial" panose="020B0604020202020204" pitchFamily="34" charset="0"/>
               </a:rPr>
-              <a:t>Cloud One Workload Security API e</a:t>
-            </a:r>
-            <a:r>
-              <a:rPr lang="en-US" altLang="en-US" sz="1100" smtClean="0">
-                <a:latin typeface="Arial" panose="020B0604020202020204" pitchFamily="34" charset="0"/>
-                <a:ea typeface="Amazon Ember" panose="020B0603020204020204" pitchFamily="34" charset="0"/>
-                <a:cs typeface="Arial" panose="020B0604020202020204" pitchFamily="34" charset="0"/>
-              </a:rPr>
-              <a:t>ndpoint</a:t>
+              <a:t>Cloud One Workload Security API endpoint</a:t>
             </a:r>
             <a:endParaRPr lang="en-US" altLang="en-US" sz="1100" dirty="0">
               <a:latin typeface="Arial" panose="020B0604020202020204" pitchFamily="34" charset="0"/>
@@ -4772,7 +4764,7 @@
           <a:blip r:embed="rId8">
             <a:extLst>
               <a:ext uri="{96DAC541-7B7A-43D3-8B79-37D633B846F1}">
-                <asvg:svgBlip xmlns:asvg="http://schemas.microsoft.com/office/drawing/2016/SVG/main" xmlns="" r:embed="rId9"/>
+                <asvg:svgBlip xmlns="" xmlns:asvg="http://schemas.microsoft.com/office/drawing/2016/SVG/main" r:embed="rId9"/>
               </a:ext>
             </a:extLst>
           </a:blip>
@@ -4781,7 +4773,7 @@
         </p:blipFill>
         <p:spPr bwMode="auto">
           <a:xfrm>
-            <a:off x="5929704" y="4387384"/>
+            <a:off x="7666330" y="4665421"/>
             <a:ext cx="457200" cy="457200"/>
           </a:xfrm>
           <a:prstGeom prst="rect">
@@ -4828,7 +4820,7 @@
         </p:nvSpPr>
         <p:spPr bwMode="auto">
           <a:xfrm>
-            <a:off x="2885282" y="3594778"/>
+            <a:off x="4621908" y="3872815"/>
             <a:ext cx="961909" cy="261610"/>
           </a:xfrm>
           <a:prstGeom prst="rect">
@@ -5002,7 +4994,7 @@
         </p:blipFill>
         <p:spPr bwMode="auto">
           <a:xfrm>
-            <a:off x="3137995" y="3137109"/>
+            <a:off x="4874621" y="3415146"/>
             <a:ext cx="457200" cy="457200"/>
           </a:xfrm>
           <a:prstGeom prst="rect">
@@ -5049,7 +5041,7 @@
         </p:nvSpPr>
         <p:spPr bwMode="auto">
           <a:xfrm>
-            <a:off x="4740415" y="2116737"/>
+            <a:off x="6477041" y="2394774"/>
             <a:ext cx="1097280" cy="457200"/>
           </a:xfrm>
           <a:prstGeom prst="rect">
@@ -5228,7 +5220,7 @@
         </p:blipFill>
         <p:spPr bwMode="auto">
           <a:xfrm>
-            <a:off x="5062321" y="1717181"/>
+            <a:off x="6798947" y="1995218"/>
             <a:ext cx="457200" cy="457200"/>
           </a:xfrm>
           <a:prstGeom prst="rect">
@@ -5288,7 +5280,7 @@
         </p:blipFill>
         <p:spPr bwMode="auto">
           <a:xfrm>
-            <a:off x="6173608" y="1687547"/>
+            <a:off x="7910234" y="1965584"/>
             <a:ext cx="457200" cy="457200"/>
           </a:xfrm>
           <a:prstGeom prst="rect">
@@ -5335,7 +5327,7 @@
         </p:nvSpPr>
         <p:spPr bwMode="auto">
           <a:xfrm>
-            <a:off x="5838418" y="2142466"/>
+            <a:off x="7575044" y="2420503"/>
             <a:ext cx="1115568" cy="430887"/>
           </a:xfrm>
           <a:prstGeom prst="rect">
@@ -5503,7 +5495,7 @@
         </p:nvCxnSpPr>
         <p:spPr>
           <a:xfrm>
-            <a:off x="2042160" y="1966976"/>
+            <a:off x="3778786" y="2245013"/>
             <a:ext cx="975360" cy="742"/>
           </a:xfrm>
           <a:prstGeom prst="straightConnector1">
@@ -5546,7 +5538,7 @@
         </p:nvSpPr>
         <p:spPr>
           <a:xfrm>
-            <a:off x="4786938" y="1097280"/>
+            <a:off x="6523564" y="1375317"/>
             <a:ext cx="2103120" cy="1737360"/>
           </a:xfrm>
           <a:prstGeom prst="rect">
@@ -5599,13 +5591,6 @@
               </a:rPr>
               <a:t>Managed account</a:t>
             </a:r>
-            <a:endParaRPr lang="en-US" sz="1200" smtClean="0">
-              <a:solidFill>
-                <a:srgbClr val="5A6B86"/>
-              </a:solidFill>
-              <a:latin typeface="Arial" panose="020B0604020202020204" pitchFamily="34" charset="0"/>
-              <a:cs typeface="Arial" panose="020B0604020202020204" pitchFamily="34" charset="0"/>
-            </a:endParaRPr>
           </a:p>
         </p:txBody>
       </p:sp>
@@ -5627,7 +5612,7 @@
         </p:nvCxnSpPr>
         <p:spPr>
           <a:xfrm>
-            <a:off x="1663367" y="2812669"/>
+            <a:off x="3399993" y="3090706"/>
             <a:ext cx="333" cy="1574596"/>
           </a:xfrm>
           <a:prstGeom prst="straightConnector1">
@@ -5674,7 +5659,7 @@
         </p:nvCxnSpPr>
         <p:spPr>
           <a:xfrm>
-            <a:off x="1892300" y="4615865"/>
+            <a:off x="3628926" y="4893902"/>
             <a:ext cx="1246694" cy="0"/>
           </a:xfrm>
           <a:prstGeom prst="straightConnector1">
@@ -5721,7 +5706,7 @@
         </p:nvCxnSpPr>
         <p:spPr>
           <a:xfrm flipV="1">
-            <a:off x="3779520" y="1965960"/>
+            <a:off x="5516146" y="2243997"/>
             <a:ext cx="1007418" cy="1758"/>
           </a:xfrm>
           <a:prstGeom prst="straightConnector1">
@@ -5764,7 +5749,7 @@
         </p:nvSpPr>
         <p:spPr>
           <a:xfrm>
-            <a:off x="914400" y="1097280"/>
+            <a:off x="2651026" y="1375317"/>
             <a:ext cx="3383280" cy="4297680"/>
           </a:xfrm>
           <a:prstGeom prst="rect">
@@ -5838,7 +5823,7 @@
         </p:nvCxnSpPr>
         <p:spPr>
           <a:xfrm flipH="1" flipV="1">
-            <a:off x="3366237" y="3856388"/>
+            <a:off x="5102863" y="4134425"/>
             <a:ext cx="1357" cy="530877"/>
           </a:xfrm>
           <a:prstGeom prst="straightConnector1">
@@ -5885,7 +5870,7 @@
         </p:nvCxnSpPr>
         <p:spPr>
           <a:xfrm>
-            <a:off x="3596194" y="4615865"/>
+            <a:off x="5332820" y="4893902"/>
             <a:ext cx="2333510" cy="119"/>
           </a:xfrm>
           <a:prstGeom prst="straightConnector1">
@@ -5928,7 +5913,7 @@
         </p:nvSpPr>
         <p:spPr>
           <a:xfrm rot="16200000" flipH="1" flipV="1">
-            <a:off x="4013299" y="2080952"/>
+            <a:off x="5749925" y="2358989"/>
             <a:ext cx="870081" cy="1729152"/>
           </a:xfrm>
           <a:custGeom>
@@ -6010,6 +5995,281 @@
           </a:p>
         </p:txBody>
       </p:sp>
+      <p:pic>
+        <p:nvPicPr>
+          <p:cNvPr id="42" name="Graphic 22">
+            <a:extLst>
+              <a:ext uri="{FF2B5EF4-FFF2-40B4-BE49-F238E27FC236}">
+                <a16:creationId xmlns:a16="http://schemas.microsoft.com/office/drawing/2014/main" id="{8ABF4DC3-21DD-F148-976A-E2C78367A386}"/>
+              </a:ext>
+            </a:extLst>
+          </p:cNvPr>
+          <p:cNvPicPr>
+            <a:picLocks noChangeAspect="1" noChangeArrowheads="1"/>
+          </p:cNvPicPr>
+          <p:nvPr/>
+        </p:nvPicPr>
+        <p:blipFill>
+          <a:blip r:embed="rId13">
+            <a:extLst>
+              <a:ext uri="{96DAC541-7B7A-43D3-8B79-37D633B846F1}">
+                <asvg:svgBlip xmlns:asvg="http://schemas.microsoft.com/office/drawing/2016/SVG/main" xmlns="" r:embed="rId20"/>
+              </a:ext>
+            </a:extLst>
+          </a:blip>
+          <a:srcRect/>
+          <a:stretch/>
+        </p:blipFill>
+        <p:spPr bwMode="auto">
+          <a:xfrm>
+            <a:off x="1542439" y="2010805"/>
+            <a:ext cx="469900" cy="469900"/>
+          </a:xfrm>
+          <a:prstGeom prst="rect">
+            <a:avLst/>
+          </a:prstGeom>
+          <a:noFill/>
+          <a:ln>
+            <a:noFill/>
+          </a:ln>
+          <a:extLst>
+            <a:ext uri="{909E8E84-426E-40DD-AFC4-6F175D3DCCD1}">
+              <a14:hiddenFill xmlns:a14="http://schemas.microsoft.com/office/drawing/2010/main">
+                <a:solidFill>
+                  <a:srgbClr val="FFFFFF"/>
+                </a:solidFill>
+              </a14:hiddenFill>
+            </a:ext>
+            <a:ext uri="{91240B29-F687-4F45-9708-019B960494DF}">
+              <a14:hiddenLine xmlns:a14="http://schemas.microsoft.com/office/drawing/2010/main" w="9525">
+                <a:solidFill>
+                  <a:srgbClr val="000000"/>
+                </a:solidFill>
+                <a:miter lim="800000"/>
+                <a:headEnd/>
+                <a:tailEnd/>
+              </a14:hiddenLine>
+            </a:ext>
+          </a:extLst>
+        </p:spPr>
+      </p:pic>
+      <p:sp>
+        <p:nvSpPr>
+          <p:cNvPr id="43" name="TextBox 39">
+            <a:extLst>
+              <a:ext uri="{FF2B5EF4-FFF2-40B4-BE49-F238E27FC236}">
+                <a16:creationId xmlns:a16="http://schemas.microsoft.com/office/drawing/2014/main" id="{AC9D78F5-1A22-844B-8801-818696526725}"/>
+              </a:ext>
+            </a:extLst>
+          </p:cNvPr>
+          <p:cNvSpPr txBox="1">
+            <a:spLocks noChangeArrowheads="1"/>
+          </p:cNvSpPr>
+          <p:nvPr/>
+        </p:nvSpPr>
+        <p:spPr bwMode="auto">
+          <a:xfrm>
+            <a:off x="1245004" y="2493508"/>
+            <a:ext cx="1073150" cy="261610"/>
+          </a:xfrm>
+          <a:prstGeom prst="rect">
+            <a:avLst/>
+          </a:prstGeom>
+          <a:noFill/>
+          <a:ln>
+            <a:noFill/>
+          </a:ln>
+          <a:extLst>
+            <a:ext uri="{909E8E84-426E-40DD-AFC4-6F175D3DCCD1}">
+              <a14:hiddenFill xmlns:a14="http://schemas.microsoft.com/office/drawing/2010/main">
+                <a:solidFill>
+                  <a:srgbClr val="FFFFFF"/>
+                </a:solidFill>
+              </a14:hiddenFill>
+            </a:ext>
+            <a:ext uri="{91240B29-F687-4F45-9708-019B960494DF}">
+              <a14:hiddenLine xmlns:a14="http://schemas.microsoft.com/office/drawing/2010/main" w="9525">
+                <a:solidFill>
+                  <a:srgbClr val="000000"/>
+                </a:solidFill>
+                <a:miter lim="800000"/>
+                <a:headEnd/>
+                <a:tailEnd/>
+              </a14:hiddenLine>
+            </a:ext>
+          </a:extLst>
+        </p:spPr>
+        <p:txBody>
+          <a:bodyPr>
+            <a:spAutoFit/>
+          </a:bodyPr>
+          <a:lstStyle>
+            <a:lvl1pPr>
+              <a:defRPr>
+                <a:solidFill>
+                  <a:schemeClr val="tx1"/>
+                </a:solidFill>
+                <a:latin typeface="Calibri" panose="020F0502020204030204" pitchFamily="34" charset="0"/>
+              </a:defRPr>
+            </a:lvl1pPr>
+            <a:lvl2pPr marL="742950" indent="-285750">
+              <a:defRPr>
+                <a:solidFill>
+                  <a:schemeClr val="tx1"/>
+                </a:solidFill>
+                <a:latin typeface="Calibri" panose="020F0502020204030204" pitchFamily="34" charset="0"/>
+              </a:defRPr>
+            </a:lvl2pPr>
+            <a:lvl3pPr marL="1143000" indent="-228600">
+              <a:defRPr>
+                <a:solidFill>
+                  <a:schemeClr val="tx1"/>
+                </a:solidFill>
+                <a:latin typeface="Calibri" panose="020F0502020204030204" pitchFamily="34" charset="0"/>
+              </a:defRPr>
+            </a:lvl3pPr>
+            <a:lvl4pPr marL="1600200" indent="-228600">
+              <a:defRPr>
+                <a:solidFill>
+                  <a:schemeClr val="tx1"/>
+                </a:solidFill>
+                <a:latin typeface="Calibri" panose="020F0502020204030204" pitchFamily="34" charset="0"/>
+              </a:defRPr>
+            </a:lvl4pPr>
+            <a:lvl5pPr marL="2057400" indent="-228600">
+              <a:defRPr>
+                <a:solidFill>
+                  <a:schemeClr val="tx1"/>
+                </a:solidFill>
+                <a:latin typeface="Calibri" panose="020F0502020204030204" pitchFamily="34" charset="0"/>
+              </a:defRPr>
+            </a:lvl5pPr>
+            <a:lvl6pPr marL="2514600" indent="-228600" eaLnBrk="0" fontAlgn="base" hangingPunct="0">
+              <a:spcBef>
+                <a:spcPct val="0"/>
+              </a:spcBef>
+              <a:spcAft>
+                <a:spcPct val="0"/>
+              </a:spcAft>
+              <a:defRPr>
+                <a:solidFill>
+                  <a:schemeClr val="tx1"/>
+                </a:solidFill>
+                <a:latin typeface="Calibri" panose="020F0502020204030204" pitchFamily="34" charset="0"/>
+              </a:defRPr>
+            </a:lvl6pPr>
+            <a:lvl7pPr marL="2971800" indent="-228600" eaLnBrk="0" fontAlgn="base" hangingPunct="0">
+              <a:spcBef>
+                <a:spcPct val="0"/>
+              </a:spcBef>
+              <a:spcAft>
+                <a:spcPct val="0"/>
+              </a:spcAft>
+              <a:defRPr>
+                <a:solidFill>
+                  <a:schemeClr val="tx1"/>
+                </a:solidFill>
+                <a:latin typeface="Calibri" panose="020F0502020204030204" pitchFamily="34" charset="0"/>
+              </a:defRPr>
+            </a:lvl7pPr>
+            <a:lvl8pPr marL="3429000" indent="-228600" eaLnBrk="0" fontAlgn="base" hangingPunct="0">
+              <a:spcBef>
+                <a:spcPct val="0"/>
+              </a:spcBef>
+              <a:spcAft>
+                <a:spcPct val="0"/>
+              </a:spcAft>
+              <a:defRPr>
+                <a:solidFill>
+                  <a:schemeClr val="tx1"/>
+                </a:solidFill>
+                <a:latin typeface="Calibri" panose="020F0502020204030204" pitchFamily="34" charset="0"/>
+              </a:defRPr>
+            </a:lvl8pPr>
+            <a:lvl9pPr marL="3886200" indent="-228600" eaLnBrk="0" fontAlgn="base" hangingPunct="0">
+              <a:spcBef>
+                <a:spcPct val="0"/>
+              </a:spcBef>
+              <a:spcAft>
+                <a:spcPct val="0"/>
+              </a:spcAft>
+              <a:defRPr>
+                <a:solidFill>
+                  <a:schemeClr val="tx1"/>
+                </a:solidFill>
+                <a:latin typeface="Calibri" panose="020F0502020204030204" pitchFamily="34" charset="0"/>
+              </a:defRPr>
+            </a:lvl9pPr>
+          </a:lstStyle>
+          <a:p>
+            <a:pPr algn="ctr" eaLnBrk="1" hangingPunct="1"/>
+            <a:r>
+              <a:rPr lang="en-US" altLang="en-US" sz="1100" smtClean="0">
+                <a:solidFill>
+                  <a:srgbClr val="000000"/>
+                </a:solidFill>
+                <a:latin typeface="Arial" panose="020B0604020202020204" pitchFamily="34" charset="0"/>
+                <a:cs typeface="Arial" panose="020B0604020202020204" pitchFamily="34" charset="0"/>
+              </a:rPr>
+              <a:t>Administrator</a:t>
+            </a:r>
+            <a:endParaRPr lang="en-US" altLang="en-US" sz="1100" dirty="0">
+              <a:solidFill>
+                <a:srgbClr val="000000"/>
+              </a:solidFill>
+              <a:latin typeface="Arial" panose="020B0604020202020204" pitchFamily="34" charset="0"/>
+              <a:cs typeface="Arial" panose="020B0604020202020204" pitchFamily="34" charset="0"/>
+            </a:endParaRPr>
+          </a:p>
+        </p:txBody>
+      </p:sp>
+      <p:cxnSp>
+        <p:nvCxnSpPr>
+          <p:cNvPr id="44" name="Straight Arrow Connector 43">
+            <a:extLst>
+              <a:ext uri="{FF2B5EF4-FFF2-40B4-BE49-F238E27FC236}">
+                <a16:creationId xmlns:a16="http://schemas.microsoft.com/office/drawing/2014/main" id="{9E8BEF15-E8C4-2242-949A-672EF8C74E91}"/>
+              </a:ext>
+            </a:extLst>
+          </p:cNvPr>
+          <p:cNvCxnSpPr>
+            <a:cxnSpLocks/>
+            <a:stCxn id="42" idx="3"/>
+            <a:endCxn id="50" idx="1"/>
+          </p:cNvCxnSpPr>
+          <p:nvPr/>
+        </p:nvCxnSpPr>
+        <p:spPr>
+          <a:xfrm flipV="1">
+            <a:off x="2012339" y="2245013"/>
+            <a:ext cx="1004447" cy="742"/>
+          </a:xfrm>
+          <a:prstGeom prst="straightConnector1">
+            <a:avLst/>
+          </a:prstGeom>
+          <a:ln w="12700">
+            <a:solidFill>
+              <a:srgbClr val="545B64"/>
+            </a:solidFill>
+            <a:headEnd type="none" w="med" len="sm"/>
+            <a:tailEnd type="arrow" w="med" len="sm"/>
+          </a:ln>
+        </p:spPr>
+        <p:style>
+          <a:lnRef idx="1">
+            <a:schemeClr val="accent1"/>
+          </a:lnRef>
+          <a:fillRef idx="0">
+            <a:schemeClr val="accent1"/>
+          </a:fillRef>
+          <a:effectRef idx="0">
+            <a:schemeClr val="accent1"/>
+          </a:effectRef>
+          <a:fontRef idx="minor">
+            <a:schemeClr val="tx1"/>
+          </a:fontRef>
+        </p:style>
+      </p:cxnSp>
     </p:spTree>
     <p:extLst>
       <p:ext uri="{BB962C8B-B14F-4D97-AF65-F5344CB8AC3E}">

</xml_diff>